<commit_message>
Update Estrategia de equipo de alto desempeño.pptx
</commit_message>
<xml_diff>
--- a/Estrategia de equipo de alto desempeño.pptx
+++ b/Estrategia de equipo de alto desempeño.pptx
@@ -34,31 +34,35 @@
       <p:boldItalic r:id="rId14"/>
     </p:embeddedFont>
     <p:embeddedFont>
-      <p:font typeface="Impact" panose="020B0806030902050204" pitchFamily="34" charset="0"/>
+      <p:font typeface="Gloucester MT Extra Condensed" panose="02030808020601010101" pitchFamily="18" charset="0"/>
       <p:regular r:id="rId15"/>
     </p:embeddedFont>
     <p:embeddedFont>
+      <p:font typeface="Impact" panose="020B0806030902050204" pitchFamily="34" charset="0"/>
+      <p:regular r:id="rId16"/>
+    </p:embeddedFont>
+    <p:embeddedFont>
       <p:font typeface="Lao UI" panose="020B0502040204020203" pitchFamily="34" charset="0"/>
-      <p:regular r:id="rId16"/>
-      <p:bold r:id="rId17"/>
+      <p:regular r:id="rId17"/>
+      <p:bold r:id="rId18"/>
     </p:embeddedFont>
     <p:embeddedFont>
       <p:font typeface="Lato" panose="020F0502020204030203" pitchFamily="34" charset="0"/>
-      <p:regular r:id="rId18"/>
-      <p:bold r:id="rId19"/>
-      <p:italic r:id="rId20"/>
-      <p:boldItalic r:id="rId21"/>
+      <p:regular r:id="rId19"/>
+      <p:bold r:id="rId20"/>
+      <p:italic r:id="rId21"/>
+      <p:boldItalic r:id="rId22"/>
     </p:embeddedFont>
     <p:embeddedFont>
       <p:font typeface="MV Boli" panose="02000500030200090000" pitchFamily="2" charset="0"/>
-      <p:regular r:id="rId22"/>
+      <p:regular r:id="rId23"/>
     </p:embeddedFont>
     <p:embeddedFont>
       <p:font typeface="Roboto" panose="02000000000000000000" pitchFamily="2" charset="0"/>
-      <p:regular r:id="rId23"/>
-      <p:bold r:id="rId24"/>
-      <p:italic r:id="rId25"/>
-      <p:boldItalic r:id="rId26"/>
+      <p:regular r:id="rId24"/>
+      <p:bold r:id="rId25"/>
+      <p:italic r:id="rId26"/>
+      <p:boldItalic r:id="rId27"/>
     </p:embeddedFont>
   </p:embeddedFontLst>
   <p:defaultTextStyle>
@@ -8446,26 +8450,26 @@
               <a:buNone/>
             </a:pPr>
             <a:r>
-              <a:rPr lang="es-419" sz="2800" dirty="0">
+              <a:rPr lang="es-419" sz="3600" dirty="0">
                 <a:solidFill>
                   <a:schemeClr val="accent6">
                     <a:lumMod val="50000"/>
                   </a:schemeClr>
                 </a:solidFill>
-                <a:latin typeface="Birds of Paradise  Personal use" pitchFamily="2" charset="0"/>
+                <a:latin typeface="Gloucester MT Extra Condensed" panose="02030808020601010101" pitchFamily="18" charset="0"/>
                 <a:ea typeface="Comfortaa"/>
                 <a:cs typeface="Comfortaa"/>
                 <a:sym typeface="Comfortaa"/>
               </a:rPr>
               <a:t>“No hay manera de fallar, si el proyecto tiene un plan”</a:t>
             </a:r>
-            <a:endParaRPr sz="2800" dirty="0">
+            <a:endParaRPr sz="3600" dirty="0">
               <a:solidFill>
                 <a:schemeClr val="accent6">
                   <a:lumMod val="50000"/>
                 </a:schemeClr>
               </a:solidFill>
-              <a:latin typeface="Birds of Paradise  Personal use" pitchFamily="2" charset="0"/>
+              <a:latin typeface="Gloucester MT Extra Condensed" panose="02030808020601010101" pitchFamily="18" charset="0"/>
               <a:ea typeface="Comfortaa"/>
               <a:cs typeface="Comfortaa"/>
               <a:sym typeface="Comfortaa"/>

</xml_diff>